<commit_message>
a little bit change
</commit_message>
<xml_diff>
--- a/Poster.pptx
+++ b/Poster.pptx
@@ -104,6 +104,11 @@
       </a:defRPr>
     </a:lvl9pPr>
   </p:defaultTextStyle>
+  <p:extLst>
+    <p:ext uri="{EFAFB233-063F-42B5-8137-9DF3F51BA10A}">
+      <p15:sldGuideLst xmlns:p15="http://schemas.microsoft.com/office/powerpoint/2012/main"/>
+    </p:ext>
+  </p:extLst>
 </p:presentation>
 </file>
 
@@ -254,7 +259,7 @@
           <a:p>
             <a:fld id="{0509A793-EF4F-4C25-B07C-E3828FFD6239}" type="datetimeFigureOut">
               <a:rPr lang="en-US" smtClean="0"/>
-              <a:t>12/7/2020</a:t>
+              <a:t>12/9/20</a:t>
             </a:fld>
             <a:endParaRPr lang="en-US"/>
           </a:p>
@@ -452,7 +457,7 @@
           <a:p>
             <a:fld id="{0509A793-EF4F-4C25-B07C-E3828FFD6239}" type="datetimeFigureOut">
               <a:rPr lang="en-US" smtClean="0"/>
-              <a:t>12/7/2020</a:t>
+              <a:t>12/9/20</a:t>
             </a:fld>
             <a:endParaRPr lang="en-US"/>
           </a:p>
@@ -660,7 +665,7 @@
           <a:p>
             <a:fld id="{0509A793-EF4F-4C25-B07C-E3828FFD6239}" type="datetimeFigureOut">
               <a:rPr lang="en-US" smtClean="0"/>
-              <a:t>12/7/2020</a:t>
+              <a:t>12/9/20</a:t>
             </a:fld>
             <a:endParaRPr lang="en-US"/>
           </a:p>
@@ -858,7 +863,7 @@
           <a:p>
             <a:fld id="{0509A793-EF4F-4C25-B07C-E3828FFD6239}" type="datetimeFigureOut">
               <a:rPr lang="en-US" smtClean="0"/>
-              <a:t>12/7/2020</a:t>
+              <a:t>12/9/20</a:t>
             </a:fld>
             <a:endParaRPr lang="en-US"/>
           </a:p>
@@ -1133,7 +1138,7 @@
           <a:p>
             <a:fld id="{0509A793-EF4F-4C25-B07C-E3828FFD6239}" type="datetimeFigureOut">
               <a:rPr lang="en-US" smtClean="0"/>
-              <a:t>12/7/2020</a:t>
+              <a:t>12/9/20</a:t>
             </a:fld>
             <a:endParaRPr lang="en-US"/>
           </a:p>
@@ -1398,7 +1403,7 @@
           <a:p>
             <a:fld id="{0509A793-EF4F-4C25-B07C-E3828FFD6239}" type="datetimeFigureOut">
               <a:rPr lang="en-US" smtClean="0"/>
-              <a:t>12/7/2020</a:t>
+              <a:t>12/9/20</a:t>
             </a:fld>
             <a:endParaRPr lang="en-US"/>
           </a:p>
@@ -1810,7 +1815,7 @@
           <a:p>
             <a:fld id="{0509A793-EF4F-4C25-B07C-E3828FFD6239}" type="datetimeFigureOut">
               <a:rPr lang="en-US" smtClean="0"/>
-              <a:t>12/7/2020</a:t>
+              <a:t>12/9/20</a:t>
             </a:fld>
             <a:endParaRPr lang="en-US"/>
           </a:p>
@@ -1951,7 +1956,7 @@
           <a:p>
             <a:fld id="{0509A793-EF4F-4C25-B07C-E3828FFD6239}" type="datetimeFigureOut">
               <a:rPr lang="en-US" smtClean="0"/>
-              <a:t>12/7/2020</a:t>
+              <a:t>12/9/20</a:t>
             </a:fld>
             <a:endParaRPr lang="en-US"/>
           </a:p>
@@ -2064,7 +2069,7 @@
           <a:p>
             <a:fld id="{0509A793-EF4F-4C25-B07C-E3828FFD6239}" type="datetimeFigureOut">
               <a:rPr lang="en-US" smtClean="0"/>
-              <a:t>12/7/2020</a:t>
+              <a:t>12/9/20</a:t>
             </a:fld>
             <a:endParaRPr lang="en-US"/>
           </a:p>
@@ -2375,7 +2380,7 @@
           <a:p>
             <a:fld id="{0509A793-EF4F-4C25-B07C-E3828FFD6239}" type="datetimeFigureOut">
               <a:rPr lang="en-US" smtClean="0"/>
-              <a:t>12/7/2020</a:t>
+              <a:t>12/9/20</a:t>
             </a:fld>
             <a:endParaRPr lang="en-US"/>
           </a:p>
@@ -2663,7 +2668,7 @@
           <a:p>
             <a:fld id="{0509A793-EF4F-4C25-B07C-E3828FFD6239}" type="datetimeFigureOut">
               <a:rPr lang="en-US" smtClean="0"/>
-              <a:t>12/7/2020</a:t>
+              <a:t>12/9/20</a:t>
             </a:fld>
             <a:endParaRPr lang="en-US"/>
           </a:p>
@@ -2904,7 +2909,7 @@
           <a:p>
             <a:fld id="{0509A793-EF4F-4C25-B07C-E3828FFD6239}" type="datetimeFigureOut">
               <a:rPr lang="en-US" smtClean="0"/>
-              <a:t>12/7/2020</a:t>
+              <a:t>12/9/20</a:t>
             </a:fld>
             <a:endParaRPr lang="en-US"/>
           </a:p>
@@ -3339,8 +3344,8 @@
         </p:nvSpPr>
         <p:spPr>
           <a:xfrm>
-            <a:off x="5253566" y="237066"/>
-            <a:ext cx="1684867" cy="389466"/>
+            <a:off x="4572649" y="258221"/>
+            <a:ext cx="2868435" cy="389466"/>
           </a:xfrm>
         </p:spPr>
         <p:txBody>
@@ -3350,7 +3355,7 @@
           <a:lstStyle/>
           <a:p>
             <a:r>
-              <a:rPr lang="en-US" sz="1600" dirty="0"/>
+              <a:rPr lang="en-US" sz="2000" b="1" dirty="0"/>
               <a:t>Minesweeper Solver</a:t>
             </a:r>
             <a:br>
@@ -3378,7 +3383,7 @@
         <p:spPr>
           <a:xfrm>
             <a:off x="581064" y="629807"/>
-            <a:ext cx="1885644" cy="3362331"/>
+            <a:ext cx="1885644" cy="3423886"/>
           </a:xfrm>
           <a:prstGeom prst="rect">
             <a:avLst/>
@@ -3391,9 +3396,12 @@
           </a:bodyPr>
           <a:lstStyle/>
           <a:p>
-            <a:pPr algn="ctr"/>
-            <a:r>
-              <a:rPr lang="en-US" sz="1000" dirty="0"/>
+            <a:pPr marL="171450" indent="-171450" algn="ctr">
+              <a:buFont typeface="Wingdings" pitchFamily="2" charset="2"/>
+              <a:buChar char="Ø"/>
+            </a:pPr>
+            <a:r>
+              <a:rPr lang="en-US" sz="1200" b="1" i="1" dirty="0"/>
               <a:t>Introduction</a:t>
             </a:r>
           </a:p>
@@ -4883,9 +4891,12 @@
           </a:bodyPr>
           <a:lstStyle/>
           <a:p>
-            <a:pPr algn="ctr"/>
-            <a:r>
-              <a:rPr lang="en-US" sz="1000" dirty="0"/>
+            <a:pPr marL="171450" indent="-171450" algn="ctr">
+              <a:buFont typeface="Wingdings" pitchFamily="2" charset="2"/>
+              <a:buChar char="Ø"/>
+            </a:pPr>
+            <a:r>
+              <a:rPr lang="en-US" sz="1200" b="1" i="1" dirty="0"/>
               <a:t>Methodology</a:t>
             </a:r>
           </a:p>
@@ -4900,7 +4911,7 @@
             </a:r>
             <a:r>
               <a:rPr lang="en-US" sz="1000" dirty="0"/>
-              <a:t>. Figure xx shows the model architecture.</a:t>
+              <a:t>. Figure 2.1 shows the model architecture.</a:t>
             </a:r>
           </a:p>
           <a:p>
@@ -5056,9 +5067,12 @@
           </a:bodyPr>
           <a:lstStyle/>
           <a:p>
-            <a:pPr algn="ctr"/>
-            <a:r>
-              <a:rPr lang="en-US" sz="1000" dirty="0"/>
+            <a:pPr marL="171450" indent="-171450" algn="ctr">
+              <a:buFont typeface="Wingdings" pitchFamily="2" charset="2"/>
+              <a:buChar char="Ø"/>
+            </a:pPr>
+            <a:r>
+              <a:rPr lang="en-US" sz="1200" b="1" i="1" dirty="0"/>
               <a:t>Results</a:t>
             </a:r>
           </a:p>
@@ -5081,16 +5095,7 @@
                 <a:ea typeface="DengXian" panose="02010600030101010101" pitchFamily="2" charset="-122"/>
                 <a:cs typeface="Times New Roman" panose="02020603050405020304" pitchFamily="18" charset="0"/>
               </a:rPr>
-              <a:t>To maximize local optimum decisions for every single action, cross entropy with uniformed correct next move probably distribution is used to gradient descend the parameters. </a:t>
-            </a:r>
-            <a:r>
-              <a:rPr lang="en-US" sz="1000" b="1" dirty="0">
-                <a:effectLst/>
-                <a:latin typeface="Calibri" panose="020F0502020204030204" pitchFamily="34" charset="0"/>
-                <a:ea typeface="DengXian" panose="02010600030101010101" pitchFamily="2" charset="-122"/>
-                <a:cs typeface="Times New Roman" panose="02020603050405020304" pitchFamily="18" charset="0"/>
-              </a:rPr>
-              <a:t>Figure xx shows the validity of the model.</a:t>
+              <a:t>To maximize local optimum decisions for every single action, cross entropy with uniformed correct next move probably distribution is used to gradient descend the parameters. Figure 3.1 shows the validity of the model.</a:t>
             </a:r>
             <a:endParaRPr lang="en-US" sz="1000" dirty="0">
               <a:effectLst/>
@@ -5244,7 +5249,7 @@
         <p:spPr>
           <a:xfrm>
             <a:off x="9809723" y="3831934"/>
-            <a:ext cx="1919042" cy="1631216"/>
+            <a:ext cx="1919042" cy="1661993"/>
           </a:xfrm>
           <a:prstGeom prst="rect">
             <a:avLst/>
@@ -5257,9 +5262,12 @@
           </a:bodyPr>
           <a:lstStyle/>
           <a:p>
-            <a:pPr algn="ctr"/>
-            <a:r>
-              <a:rPr lang="en-US" sz="1000" dirty="0"/>
+            <a:pPr marL="171450" indent="-171450" algn="ctr">
+              <a:buFont typeface="Wingdings" pitchFamily="2" charset="2"/>
+              <a:buChar char="Ø"/>
+            </a:pPr>
+            <a:r>
+              <a:rPr lang="en-US" sz="1200" b="1" i="1" dirty="0"/>
               <a:t>Challenges &amp; Reflection</a:t>
             </a:r>
           </a:p>
@@ -5299,8 +5307,8 @@
         </p:nvSpPr>
         <p:spPr>
           <a:xfrm>
-            <a:off x="9821244" y="5463150"/>
-            <a:ext cx="1919042" cy="400110"/>
+            <a:off x="9821245" y="5463150"/>
+            <a:ext cx="1919042" cy="584775"/>
           </a:xfrm>
           <a:prstGeom prst="rect">
             <a:avLst/>
@@ -5313,14 +5321,29 @@
           </a:bodyPr>
           <a:lstStyle/>
           <a:p>
-            <a:pPr algn="ctr"/>
-            <a:r>
-              <a:rPr lang="en-US" sz="1000" dirty="0"/>
+            <a:pPr marL="171450" indent="-171450" algn="ctr">
+              <a:buFont typeface="Wingdings" pitchFamily="2" charset="2"/>
+              <a:buChar char="Ø"/>
+            </a:pPr>
+            <a:r>
+              <a:rPr lang="en-US" sz="1200" b="1" i="1" dirty="0"/>
               <a:t>Reference</a:t>
             </a:r>
           </a:p>
           <a:p>
-            <a:endParaRPr lang="en-US" sz="1000" dirty="0"/>
+            <a:r>
+              <a:rPr lang="en-US" altLang="zh-CN" sz="1000" dirty="0"/>
+              <a:t>[1] </a:t>
+            </a:r>
+            <a:r>
+              <a:rPr lang="en-US" altLang="zh-CN" sz="1000" dirty="0" err="1"/>
+              <a:t>Nakov</a:t>
+            </a:r>
+            <a:r>
+              <a:rPr lang="en-US" altLang="zh-CN" sz="1000" dirty="0"/>
+              <a:t>, P., &amp; Wei, Z. (2003). MINESWEEPER, #MINESWEEPER</a:t>
+            </a:r>
+            <a:endParaRPr lang="zh-CN" altLang="zh-CN" sz="1000" dirty="0"/>
           </a:p>
         </p:txBody>
       </p:sp>

</xml_diff>